<commit_message>
CTECH403 up through module 5)
</commit_message>
<xml_diff>
--- a/ctech403/module_3/CTECH403 Module 3 - JSON.pptx
+++ b/ctech403/module_3/CTECH403 Module 3 - JSON.pptx
@@ -254,7 +254,7 @@
           <a:p>
             <a:fld id="{1778ACD8-6E14-F146-9986-2DDB8F18C1FA}" type="datetimeFigureOut">
               <a:rPr lang="en-US" smtClean="0"/>
-              <a:t>5/6/19</a:t>
+              <a:t>5/10/19</a:t>
             </a:fld>
             <a:endParaRPr lang="en-US"/>
           </a:p>
@@ -932,6 +932,90 @@
     <p:extLst>
       <p:ext uri="{BB962C8B-B14F-4D97-AF65-F5344CB8AC3E}">
         <p14:creationId xmlns:p14="http://schemas.microsoft.com/office/powerpoint/2010/main" val="1475629286"/>
+      </p:ext>
+    </p:extLst>
+  </p:cSld>
+  <p:clrMapOvr>
+    <a:masterClrMapping/>
+  </p:clrMapOvr>
+</p:notes>
+</file>
+
+<file path=ppt/notesSlides/notesSlide6.xml><?xml version="1.0" encoding="utf-8"?>
+<p:notes xmlns:a="http://schemas.openxmlformats.org/drawingml/2006/main" xmlns:r="http://schemas.openxmlformats.org/officeDocument/2006/relationships" xmlns:p="http://schemas.openxmlformats.org/presentationml/2006/main">
+  <p:cSld>
+    <p:spTree>
+      <p:nvGrpSpPr>
+        <p:cNvPr id="1" name=""/>
+        <p:cNvGrpSpPr/>
+        <p:nvPr/>
+      </p:nvGrpSpPr>
+      <p:grpSpPr>
+        <a:xfrm>
+          <a:off x="0" y="0"/>
+          <a:ext cx="0" cy="0"/>
+          <a:chOff x="0" y="0"/>
+          <a:chExt cx="0" cy="0"/>
+        </a:xfrm>
+      </p:grpSpPr>
+      <p:sp>
+        <p:nvSpPr>
+          <p:cNvPr id="2" name="Slide Image Placeholder 1"/>
+          <p:cNvSpPr>
+            <a:spLocks noGrp="1" noRot="1" noChangeAspect="1"/>
+          </p:cNvSpPr>
+          <p:nvPr>
+            <p:ph type="sldImg"/>
+          </p:nvPr>
+        </p:nvSpPr>
+        <p:spPr/>
+      </p:sp>
+      <p:sp>
+        <p:nvSpPr>
+          <p:cNvPr id="3" name="Notes Placeholder 2"/>
+          <p:cNvSpPr>
+            <a:spLocks noGrp="1"/>
+          </p:cNvSpPr>
+          <p:nvPr>
+            <p:ph type="body" idx="1"/>
+          </p:nvPr>
+        </p:nvSpPr>
+        <p:spPr/>
+        <p:txBody>
+          <a:bodyPr/>
+          <a:lstStyle/>
+          <a:p>
+            <a:endParaRPr lang="en-US" dirty="0"/>
+          </a:p>
+        </p:txBody>
+      </p:sp>
+      <p:sp>
+        <p:nvSpPr>
+          <p:cNvPr id="4" name="Slide Number Placeholder 3"/>
+          <p:cNvSpPr>
+            <a:spLocks noGrp="1"/>
+          </p:cNvSpPr>
+          <p:nvPr>
+            <p:ph type="sldNum" sz="quarter" idx="5"/>
+          </p:nvPr>
+        </p:nvSpPr>
+        <p:spPr/>
+        <p:txBody>
+          <a:bodyPr/>
+          <a:lstStyle/>
+          <a:p>
+            <a:fld id="{C8B14FCA-A5D1-0749-96A8-1423D61C59E6}" type="slidenum">
+              <a:rPr lang="en-US" smtClean="0"/>
+              <a:t>44</a:t>
+            </a:fld>
+            <a:endParaRPr lang="en-US"/>
+          </a:p>
+        </p:txBody>
+      </p:sp>
+    </p:spTree>
+    <p:extLst>
+      <p:ext uri="{BB962C8B-B14F-4D97-AF65-F5344CB8AC3E}">
+        <p14:creationId xmlns:p14="http://schemas.microsoft.com/office/powerpoint/2010/main" val="817783686"/>
       </p:ext>
     </p:extLst>
   </p:cSld>
@@ -6490,7 +6574,7 @@
             </a:r>
             <a:r>
               <a:rPr lang="en-US" dirty="0"/>
-              <a:t> JSON to a file, the command name is a little unintuitive. It's </a:t>
+              <a:t> JSON to a file, the function name is a little unintuitive. It's </a:t>
             </a:r>
             <a:r>
               <a:rPr lang="en-US" b="1" dirty="0"/>
@@ -6794,6 +6878,41 @@
                 </a:highlight>
               </a:rPr>
               <a:t>)</a:t>
+            </a:r>
+          </a:p>
+        </p:txBody>
+      </p:sp>
+      <p:sp>
+        <p:nvSpPr>
+          <p:cNvPr id="2" name="TextBox 1">
+            <a:extLst>
+              <a:ext uri="{FF2B5EF4-FFF2-40B4-BE49-F238E27FC236}">
+                <a16:creationId xmlns:a16="http://schemas.microsoft.com/office/drawing/2014/main" id="{FE57E64B-4D71-1742-8AD9-DFC2E994939E}"/>
+              </a:ext>
+            </a:extLst>
+          </p:cNvPr>
+          <p:cNvSpPr txBox="1"/>
+          <p:nvPr/>
+        </p:nvSpPr>
+        <p:spPr>
+          <a:xfrm>
+            <a:off x="3603009" y="6045958"/>
+            <a:ext cx="1697901" cy="369332"/>
+          </a:xfrm>
+          <a:prstGeom prst="rect">
+            <a:avLst/>
+          </a:prstGeom>
+          <a:noFill/>
+        </p:spPr>
+        <p:txBody>
+          <a:bodyPr wrap="none" rtlCol="0">
+            <a:spAutoFit/>
+          </a:bodyPr>
+          <a:lstStyle/>
+          <a:p>
+            <a:r>
+              <a:rPr lang="en-US" dirty="0"/>
+              <a:t>&lt;courses4.py&gt;</a:t>
             </a:r>
           </a:p>
         </p:txBody>

</xml_diff>